<commit_message>
verificação de desconexão com bluetooth melhorada
</commit_message>
<xml_diff>
--- a/PhysioArm_MobileApp/imagens/menu_inferior/edicao.pptx
+++ b/PhysioArm_MobileApp/imagens/menu_inferior/edicao.pptx
@@ -105,7 +105,57 @@
       </a:defRPr>
     </a:lvl9pPr>
   </p:defaultTextStyle>
+  <p:extLst>
+    <p:ext uri="{EFAFB233-063F-42B5-8137-9DF3F51BA10A}">
+      <p15:sldGuideLst xmlns:p15="http://schemas.microsoft.com/office/powerpoint/2012/main"/>
+    </p:ext>
+  </p:extLst>
 </p:presentation>
+</file>
+
+<file path=ppt/revisionInfo.xml><?xml version="1.0" encoding="utf-8"?>
+<p1510:revInfo xmlns:a="http://schemas.openxmlformats.org/drawingml/2006/main" xmlns:r="http://schemas.openxmlformats.org/officeDocument/2006/relationships" xmlns:p1510="http://schemas.microsoft.com/office/powerpoint/2015/10/main">
+  <p1510:revLst>
+    <p1510:client id="{149CDB3F-E87F-4D52-8D3D-D875E0F9E3BF}" v="2" dt="2022-03-23T23:47:54.745"/>
+  </p1510:revLst>
+</p1510:revInfo>
+</file>
+
+<file path=ppt/changesInfos/changesInfo1.xml><?xml version="1.0" encoding="utf-8"?>
+<pc:chgInfo xmlns:a="http://schemas.openxmlformats.org/drawingml/2006/main" xmlns:r="http://schemas.openxmlformats.org/officeDocument/2006/relationships" xmlns:ac="http://schemas.microsoft.com/office/drawing/2013/main/command" xmlns:pc="http://schemas.microsoft.com/office/powerpoint/2013/main/command">
+  <pc:docChgLst>
+    <pc:chgData name="Samuel Simão" userId="d62b21448909a776" providerId="LiveId" clId="{149CDB3F-E87F-4D52-8D3D-D875E0F9E3BF}"/>
+    <pc:docChg chg="custSel modSld">
+      <pc:chgData name="Samuel Simão" userId="d62b21448909a776" providerId="LiveId" clId="{149CDB3F-E87F-4D52-8D3D-D875E0F9E3BF}" dt="2022-03-23T23:48:03.198" v="5" actId="207"/>
+      <pc:docMkLst>
+        <pc:docMk/>
+      </pc:docMkLst>
+      <pc:sldChg chg="addSp delSp modSp mod">
+        <pc:chgData name="Samuel Simão" userId="d62b21448909a776" providerId="LiveId" clId="{149CDB3F-E87F-4D52-8D3D-D875E0F9E3BF}" dt="2022-03-23T23:48:03.198" v="5" actId="207"/>
+        <pc:sldMkLst>
+          <pc:docMk/>
+          <pc:sldMk cId="4031113561" sldId="256"/>
+        </pc:sldMkLst>
+        <pc:picChg chg="add del mod">
+          <ac:chgData name="Samuel Simão" userId="d62b21448909a776" providerId="LiveId" clId="{149CDB3F-E87F-4D52-8D3D-D875E0F9E3BF}" dt="2022-03-23T23:47:09.254" v="2" actId="478"/>
+          <ac:picMkLst>
+            <pc:docMk/>
+            <pc:sldMk cId="4031113561" sldId="256"/>
+            <ac:picMk id="10" creationId="{740190B4-E7D0-42E4-B486-582D3FE4F467}"/>
+          </ac:picMkLst>
+        </pc:picChg>
+        <pc:picChg chg="add mod">
+          <ac:chgData name="Samuel Simão" userId="d62b21448909a776" providerId="LiveId" clId="{149CDB3F-E87F-4D52-8D3D-D875E0F9E3BF}" dt="2022-03-23T23:48:03.198" v="5" actId="207"/>
+          <ac:picMkLst>
+            <pc:docMk/>
+            <pc:sldMk cId="4031113561" sldId="256"/>
+            <ac:picMk id="12" creationId="{9F2553D4-D64C-4577-B846-A4D5D867A43A}"/>
+          </ac:picMkLst>
+        </pc:picChg>
+      </pc:sldChg>
+    </pc:docChg>
+  </pc:docChgLst>
+</pc:chgInfo>
 </file>
 
 <file path=ppt/slideLayouts/slideLayout1.xml><?xml version="1.0" encoding="utf-8"?>
@@ -255,7 +305,7 @@
           <a:p>
             <a:fld id="{1EE0298F-79B1-4B40-B487-5DB01273EC15}" type="datetimeFigureOut">
               <a:rPr lang="pt-BR" smtClean="0"/>
-              <a:t>13/03/2022</a:t>
+              <a:t>23/03/2022</a:t>
             </a:fld>
             <a:endParaRPr lang="pt-BR"/>
           </a:p>
@@ -453,7 +503,7 @@
           <a:p>
             <a:fld id="{1EE0298F-79B1-4B40-B487-5DB01273EC15}" type="datetimeFigureOut">
               <a:rPr lang="pt-BR" smtClean="0"/>
-              <a:t>13/03/2022</a:t>
+              <a:t>23/03/2022</a:t>
             </a:fld>
             <a:endParaRPr lang="pt-BR"/>
           </a:p>
@@ -661,7 +711,7 @@
           <a:p>
             <a:fld id="{1EE0298F-79B1-4B40-B487-5DB01273EC15}" type="datetimeFigureOut">
               <a:rPr lang="pt-BR" smtClean="0"/>
-              <a:t>13/03/2022</a:t>
+              <a:t>23/03/2022</a:t>
             </a:fld>
             <a:endParaRPr lang="pt-BR"/>
           </a:p>
@@ -859,7 +909,7 @@
           <a:p>
             <a:fld id="{1EE0298F-79B1-4B40-B487-5DB01273EC15}" type="datetimeFigureOut">
               <a:rPr lang="pt-BR" smtClean="0"/>
-              <a:t>13/03/2022</a:t>
+              <a:t>23/03/2022</a:t>
             </a:fld>
             <a:endParaRPr lang="pt-BR"/>
           </a:p>
@@ -1134,7 +1184,7 @@
           <a:p>
             <a:fld id="{1EE0298F-79B1-4B40-B487-5DB01273EC15}" type="datetimeFigureOut">
               <a:rPr lang="pt-BR" smtClean="0"/>
-              <a:t>13/03/2022</a:t>
+              <a:t>23/03/2022</a:t>
             </a:fld>
             <a:endParaRPr lang="pt-BR"/>
           </a:p>
@@ -1399,7 +1449,7 @@
           <a:p>
             <a:fld id="{1EE0298F-79B1-4B40-B487-5DB01273EC15}" type="datetimeFigureOut">
               <a:rPr lang="pt-BR" smtClean="0"/>
-              <a:t>13/03/2022</a:t>
+              <a:t>23/03/2022</a:t>
             </a:fld>
             <a:endParaRPr lang="pt-BR"/>
           </a:p>
@@ -1811,7 +1861,7 @@
           <a:p>
             <a:fld id="{1EE0298F-79B1-4B40-B487-5DB01273EC15}" type="datetimeFigureOut">
               <a:rPr lang="pt-BR" smtClean="0"/>
-              <a:t>13/03/2022</a:t>
+              <a:t>23/03/2022</a:t>
             </a:fld>
             <a:endParaRPr lang="pt-BR"/>
           </a:p>
@@ -1952,7 +2002,7 @@
           <a:p>
             <a:fld id="{1EE0298F-79B1-4B40-B487-5DB01273EC15}" type="datetimeFigureOut">
               <a:rPr lang="pt-BR" smtClean="0"/>
-              <a:t>13/03/2022</a:t>
+              <a:t>23/03/2022</a:t>
             </a:fld>
             <a:endParaRPr lang="pt-BR"/>
           </a:p>
@@ -2065,7 +2115,7 @@
           <a:p>
             <a:fld id="{1EE0298F-79B1-4B40-B487-5DB01273EC15}" type="datetimeFigureOut">
               <a:rPr lang="pt-BR" smtClean="0"/>
-              <a:t>13/03/2022</a:t>
+              <a:t>23/03/2022</a:t>
             </a:fld>
             <a:endParaRPr lang="pt-BR"/>
           </a:p>
@@ -2376,7 +2426,7 @@
           <a:p>
             <a:fld id="{1EE0298F-79B1-4B40-B487-5DB01273EC15}" type="datetimeFigureOut">
               <a:rPr lang="pt-BR" smtClean="0"/>
-              <a:t>13/03/2022</a:t>
+              <a:t>23/03/2022</a:t>
             </a:fld>
             <a:endParaRPr lang="pt-BR"/>
           </a:p>
@@ -2664,7 +2714,7 @@
           <a:p>
             <a:fld id="{1EE0298F-79B1-4B40-B487-5DB01273EC15}" type="datetimeFigureOut">
               <a:rPr lang="pt-BR" smtClean="0"/>
-              <a:t>13/03/2022</a:t>
+              <a:t>23/03/2022</a:t>
             </a:fld>
             <a:endParaRPr lang="pt-BR"/>
           </a:p>
@@ -2905,7 +2955,7 @@
           <a:p>
             <a:fld id="{1EE0298F-79B1-4B40-B487-5DB01273EC15}" type="datetimeFigureOut">
               <a:rPr lang="pt-BR" smtClean="0"/>
-              <a:t>13/03/2022</a:t>
+              <a:t>23/03/2022</a:t>
             </a:fld>
             <a:endParaRPr lang="pt-BR"/>
           </a:p>
@@ -3626,6 +3676,44 @@
           </a:prstGeom>
         </p:spPr>
       </p:pic>
+      <p:pic>
+        <p:nvPicPr>
+          <p:cNvPr id="12" name="Imagem 11" descr="Ícone&#10;&#10;Descrição gerada automaticamente">
+            <a:extLst>
+              <a:ext uri="{FF2B5EF4-FFF2-40B4-BE49-F238E27FC236}">
+                <a16:creationId xmlns:a16="http://schemas.microsoft.com/office/drawing/2014/main" id="{9F2553D4-D64C-4577-B846-A4D5D867A43A}"/>
+              </a:ext>
+            </a:extLst>
+          </p:cNvPr>
+          <p:cNvPicPr>
+            <a:picLocks noChangeAspect="1"/>
+          </p:cNvPicPr>
+          <p:nvPr/>
+        </p:nvPicPr>
+        <p:blipFill rotWithShape="1">
+          <a:blip r:embed="rId5">
+            <a:extLst>
+              <a:ext uri="{28A0092B-C50C-407E-A947-70E740481C1C}">
+                <a14:useLocalDpi xmlns:a14="http://schemas.microsoft.com/office/drawing/2010/main" val="0"/>
+              </a:ext>
+            </a:extLst>
+          </a:blip>
+          <a:srcRect l="16900" r="17308"/>
+          <a:stretch/>
+        </p:blipFill>
+        <p:spPr>
+          <a:xfrm>
+            <a:off x="9117195" y="4893017"/>
+            <a:ext cx="2560320" cy="2156143"/>
+          </a:xfrm>
+          <a:prstGeom prst="rect">
+            <a:avLst/>
+          </a:prstGeom>
+          <a:solidFill>
+            <a:srgbClr val="FF0000"/>
+          </a:solidFill>
+        </p:spPr>
+      </p:pic>
     </p:spTree>
     <p:extLst>
       <p:ext uri="{BB962C8B-B14F-4D97-AF65-F5344CB8AC3E}">

</xml_diff>